<commit_message>
Lecture 3 slides update
</commit_message>
<xml_diff>
--- a/Lecture 3/cnn.pptx
+++ b/Lecture 3/cnn.pptx
@@ -11554,32 +11554,22 @@
       </p:sp>
       <p:pic>
         <p:nvPicPr>
-          <p:cNvPr id="11" name="loop">
-            <a:hlinkClick r:id="" action="ppaction://media"/>
-          </p:cNvPr>
-          <p:cNvPicPr/>
-          <p:nvPr>
-            <a:videoFile r:link="rId1"/>
-            <p:extLst>
-              <p:ext uri="{DAA4B4D4-6D71-4841-9C94-3DE7FCFB9230}">
-                <p14:media xmlns:p14="http://schemas.microsoft.com/office/powerpoint/2010/main" r:embed="rId2"/>
-              </p:ext>
-            </p:extLst>
-            <p:custDataLst>
-              <p:tags r:id="rId3"/>
-            </p:custDataLst>
-          </p:nvPr>
+          <p:cNvPr id="4" name="Picture 3"/>
+          <p:cNvPicPr>
+            <a:picLocks noChangeAspect="1"/>
+          </p:cNvPicPr>
+          <p:nvPr/>
         </p:nvPicPr>
         <p:blipFill>
-          <a:blip r:embed="rId4"/>
+          <a:blip r:embed="rId1"/>
           <a:stretch>
             <a:fillRect/>
           </a:stretch>
         </p:blipFill>
         <p:spPr>
           <a:xfrm>
-            <a:off x="8129270" y="2211070"/>
-            <a:ext cx="3418840" cy="3388995"/>
+            <a:off x="8496935" y="2310130"/>
+            <a:ext cx="2849880" cy="3030220"/>
           </a:xfrm>
           <a:prstGeom prst="rect">
             <a:avLst/>
@@ -11594,138 +11584,7 @@
   <p:timing>
     <p:tnLst>
       <p:par>
-        <p:cTn id="1" dur="indefinite" restart="never" nodeType="tmRoot">
-          <p:childTnLst>
-            <p:seq concurrent="1" nextAc="seek">
-              <p:cTn id="2" dur="indefinite" nodeType="mainSeq">
-                <p:childTnLst>
-                  <p:par>
-                    <p:cTn id="3" fill="hold">
-                      <p:stCondLst>
-                        <p:cond delay="indefinite"/>
-                        <p:cond evt="onBegin" delay="0">
-                          <p:tn val="2"/>
-                        </p:cond>
-                      </p:stCondLst>
-                      <p:childTnLst>
-                        <p:par>
-                          <p:cTn id="4" fill="hold">
-                            <p:stCondLst>
-                              <p:cond delay="0"/>
-                            </p:stCondLst>
-                            <p:childTnLst>
-                              <p:par>
-                                <p:cTn id="5" presetID="1" presetClass="mediacall" presetSubtype="0" fill="hold" nodeType="afterEffect">
-                                  <p:stCondLst>
-                                    <p:cond delay="0"/>
-                                  </p:stCondLst>
-                                  <p:childTnLst>
-                                    <p:cmd type="call" cmd="playFrom(0.0)">
-                                      <p:cBhvr additive="base">
-                                        <p:cTn id="6" dur="12000" fill="hold"/>
-                                        <p:tgtEl>
-                                          <p:spTgt spid="11"/>
-                                        </p:tgtEl>
-                                      </p:cBhvr>
-                                    </p:cmd>
-                                  </p:childTnLst>
-                                </p:cTn>
-                              </p:par>
-                            </p:childTnLst>
-                          </p:cTn>
-                        </p:par>
-                      </p:childTnLst>
-                    </p:cTn>
-                  </p:par>
-                </p:childTnLst>
-              </p:cTn>
-              <p:prevCondLst>
-                <p:cond evt="onPrev" delay="0">
-                  <p:tgtEl>
-                    <p:sldTgt/>
-                  </p:tgtEl>
-                </p:cond>
-              </p:prevCondLst>
-              <p:nextCondLst>
-                <p:cond evt="onNext" delay="0">
-                  <p:tgtEl>
-                    <p:sldTgt/>
-                  </p:tgtEl>
-                </p:cond>
-              </p:nextCondLst>
-            </p:seq>
-            <p:video fullScrn="0">
-              <p:cMediaNode>
-                <p:cTn id="7" repeatCount="indefinite" fill="hold" display="1">
-                  <p:stCondLst>
-                    <p:cond delay="indefinite"/>
-                  </p:stCondLst>
-                </p:cTn>
-                <p:tgtEl>
-                  <p:spTgt spid="11"/>
-                </p:tgtEl>
-              </p:cMediaNode>
-            </p:video>
-            <p:seq concurrent="1" nextAc="seek">
-              <p:cTn id="8" restart="whenNotActive" fill="hold" evtFilter="cancelBubble" nodeType="interactiveSeq">
-                <p:stCondLst>
-                  <p:cond evt="onClick" delay="0">
-                    <p:tgtEl>
-                      <p:spTgt spid="11"/>
-                    </p:tgtEl>
-                  </p:cond>
-                </p:stCondLst>
-                <p:endSync evt="end" delay="0">
-                  <p:rtn val="all"/>
-                </p:endSync>
-                <p:childTnLst>
-                  <p:par>
-                    <p:cTn id="9" fill="hold">
-                      <p:stCondLst>
-                        <p:cond delay="0"/>
-                      </p:stCondLst>
-                      <p:childTnLst>
-                        <p:par>
-                          <p:cTn id="10" fill="hold">
-                            <p:stCondLst>
-                              <p:cond delay="0"/>
-                            </p:stCondLst>
-                            <p:childTnLst>
-                              <p:par>
-                                <p:cTn id="11" presetID="2" presetClass="mediacall" presetSubtype="0" fill="hold" nodeType="clickEffect">
-                                  <p:stCondLst>
-                                    <p:cond delay="0"/>
-                                  </p:stCondLst>
-                                  <p:childTnLst>
-                                    <p:cmd type="call" cmd="togglePause">
-                                      <p:cBhvr additive="base">
-                                        <p:cTn id="12" dur="1" fill="hold"/>
-                                        <p:tgtEl>
-                                          <p:spTgt spid="11"/>
-                                        </p:tgtEl>
-                                      </p:cBhvr>
-                                    </p:cmd>
-                                  </p:childTnLst>
-                                </p:cTn>
-                              </p:par>
-                            </p:childTnLst>
-                          </p:cTn>
-                        </p:par>
-                      </p:childTnLst>
-                    </p:cTn>
-                  </p:par>
-                </p:childTnLst>
-              </p:cTn>
-              <p:nextCondLst>
-                <p:cond evt="onClick" delay="0">
-                  <p:tgtEl>
-                    <p:spTgt spid="11"/>
-                  </p:tgtEl>
-                </p:cond>
-              </p:nextCondLst>
-            </p:seq>
-          </p:childTnLst>
-        </p:cTn>
+        <p:cTn id="1" dur="indefinite" restart="never" nodeType="tmRoot"/>
       </p:par>
     </p:tnLst>
   </p:timing>
@@ -12269,32 +12128,22 @@
       </p:sp>
       <p:pic>
         <p:nvPicPr>
-          <p:cNvPr id="5" name="loop1">
-            <a:hlinkClick r:id="" action="ppaction://media"/>
-          </p:cNvPr>
-          <p:cNvPicPr/>
-          <p:nvPr>
-            <a:videoFile r:link="rId1"/>
-            <p:extLst>
-              <p:ext uri="{DAA4B4D4-6D71-4841-9C94-3DE7FCFB9230}">
-                <p14:media xmlns:p14="http://schemas.microsoft.com/office/powerpoint/2010/main" r:embed="rId2"/>
-              </p:ext>
-            </p:extLst>
-            <p:custDataLst>
-              <p:tags r:id="rId3"/>
-            </p:custDataLst>
-          </p:nvPr>
+          <p:cNvPr id="7" name="Picture 6"/>
+          <p:cNvPicPr>
+            <a:picLocks noChangeAspect="1"/>
+          </p:cNvPicPr>
+          <p:nvPr/>
         </p:nvPicPr>
         <p:blipFill>
-          <a:blip r:embed="rId4"/>
+          <a:blip r:embed="rId1"/>
           <a:stretch>
             <a:fillRect/>
           </a:stretch>
         </p:blipFill>
         <p:spPr>
           <a:xfrm>
-            <a:off x="2348230" y="3711575"/>
-            <a:ext cx="2465705" cy="2863850"/>
+            <a:off x="2879725" y="3457575"/>
+            <a:ext cx="2720340" cy="3131820"/>
           </a:xfrm>
           <a:prstGeom prst="rect">
             <a:avLst/>
@@ -12303,32 +12152,22 @@
       </p:pic>
       <p:pic>
         <p:nvPicPr>
-          <p:cNvPr id="6" name="loop2">
-            <a:hlinkClick r:id="" action="ppaction://media"/>
-          </p:cNvPr>
-          <p:cNvPicPr/>
-          <p:nvPr>
-            <a:videoFile r:link="rId5"/>
-            <p:extLst>
-              <p:ext uri="{DAA4B4D4-6D71-4841-9C94-3DE7FCFB9230}">
-                <p14:media xmlns:p14="http://schemas.microsoft.com/office/powerpoint/2010/main" r:embed="rId6"/>
-              </p:ext>
-            </p:extLst>
-            <p:custDataLst>
-              <p:tags r:id="rId7"/>
-            </p:custDataLst>
-          </p:nvPr>
+          <p:cNvPr id="8" name="Picture 7"/>
+          <p:cNvPicPr>
+            <a:picLocks noChangeAspect="1"/>
+          </p:cNvPicPr>
+          <p:nvPr/>
         </p:nvPicPr>
         <p:blipFill>
-          <a:blip r:embed="rId8"/>
+          <a:blip r:embed="rId2"/>
           <a:stretch>
             <a:fillRect/>
           </a:stretch>
         </p:blipFill>
         <p:spPr>
           <a:xfrm>
-            <a:off x="6365875" y="3712210"/>
-            <a:ext cx="2834005" cy="2863215"/>
+            <a:off x="6456680" y="3430270"/>
+            <a:ext cx="2755265" cy="3186430"/>
           </a:xfrm>
           <a:prstGeom prst="rect">
             <a:avLst/>
@@ -12343,225 +12182,7 @@
   <p:timing>
     <p:tnLst>
       <p:par>
-        <p:cTn id="1" dur="indefinite" restart="never" nodeType="tmRoot">
-          <p:childTnLst>
-            <p:seq concurrent="1" nextAc="seek">
-              <p:cTn id="2" dur="indefinite" nodeType="mainSeq">
-                <p:childTnLst>
-                  <p:par>
-                    <p:cTn id="3" fill="hold">
-                      <p:stCondLst>
-                        <p:cond delay="indefinite"/>
-                        <p:cond evt="onBegin" delay="0">
-                          <p:tn val="2"/>
-                        </p:cond>
-                      </p:stCondLst>
-                      <p:childTnLst>
-                        <p:par>
-                          <p:cTn id="4" fill="hold">
-                            <p:stCondLst>
-                              <p:cond delay="0"/>
-                            </p:stCondLst>
-                            <p:childTnLst>
-                              <p:par>
-                                <p:cTn id="5" presetID="1" presetClass="mediacall" presetSubtype="0" fill="hold" nodeType="afterEffect">
-                                  <p:stCondLst>
-                                    <p:cond delay="0"/>
-                                  </p:stCondLst>
-                                  <p:childTnLst>
-                                    <p:cmd type="call" cmd="playFrom(0.0)">
-                                      <p:cBhvr additive="base">
-                                        <p:cTn id="6" dur="75000" fill="hold"/>
-                                        <p:tgtEl>
-                                          <p:spTgt spid="5"/>
-                                        </p:tgtEl>
-                                      </p:cBhvr>
-                                    </p:cmd>
-                                  </p:childTnLst>
-                                </p:cTn>
-                              </p:par>
-                              <p:par>
-                                <p:cTn id="7" presetID="1" presetClass="mediacall" presetSubtype="0" fill="hold" nodeType="withEffect">
-                                  <p:stCondLst>
-                                    <p:cond delay="0"/>
-                                  </p:stCondLst>
-                                  <p:childTnLst>
-                                    <p:cmd type="call" cmd="playFrom(0.0)">
-                                      <p:cBhvr additive="base">
-                                        <p:cTn id="8" dur="27000" fill="hold"/>
-                                        <p:tgtEl>
-                                          <p:spTgt spid="6"/>
-                                        </p:tgtEl>
-                                      </p:cBhvr>
-                                    </p:cmd>
-                                  </p:childTnLst>
-                                </p:cTn>
-                              </p:par>
-                            </p:childTnLst>
-                          </p:cTn>
-                        </p:par>
-                      </p:childTnLst>
-                    </p:cTn>
-                  </p:par>
-                </p:childTnLst>
-              </p:cTn>
-              <p:prevCondLst>
-                <p:cond evt="onPrev" delay="0">
-                  <p:tgtEl>
-                    <p:sldTgt/>
-                  </p:tgtEl>
-                </p:cond>
-              </p:prevCondLst>
-              <p:nextCondLst>
-                <p:cond evt="onNext" delay="0">
-                  <p:tgtEl>
-                    <p:sldTgt/>
-                  </p:tgtEl>
-                </p:cond>
-              </p:nextCondLst>
-            </p:seq>
-            <p:video fullScrn="0">
-              <p:cMediaNode>
-                <p:cTn id="9" repeatCount="indefinite" fill="hold" display="1">
-                  <p:stCondLst>
-                    <p:cond delay="indefinite"/>
-                  </p:stCondLst>
-                </p:cTn>
-                <p:tgtEl>
-                  <p:spTgt spid="5"/>
-                </p:tgtEl>
-              </p:cMediaNode>
-            </p:video>
-            <p:video fullScrn="0">
-              <p:cMediaNode>
-                <p:cTn id="10" repeatCount="indefinite" fill="hold" display="1">
-                  <p:stCondLst>
-                    <p:cond delay="indefinite"/>
-                  </p:stCondLst>
-                </p:cTn>
-                <p:tgtEl>
-                  <p:spTgt spid="6"/>
-                </p:tgtEl>
-              </p:cMediaNode>
-            </p:video>
-            <p:seq concurrent="1" nextAc="seek">
-              <p:cTn id="11" restart="whenNotActive" fill="hold" evtFilter="cancelBubble" nodeType="interactiveSeq">
-                <p:stCondLst>
-                  <p:cond evt="onClick" delay="0">
-                    <p:tgtEl>
-                      <p:spTgt spid="5"/>
-                    </p:tgtEl>
-                  </p:cond>
-                </p:stCondLst>
-                <p:endSync evt="end" delay="0">
-                  <p:rtn val="all"/>
-                </p:endSync>
-                <p:childTnLst>
-                  <p:par>
-                    <p:cTn id="12" fill="hold">
-                      <p:stCondLst>
-                        <p:cond delay="0"/>
-                      </p:stCondLst>
-                      <p:childTnLst>
-                        <p:par>
-                          <p:cTn id="13" fill="hold">
-                            <p:stCondLst>
-                              <p:cond delay="0"/>
-                            </p:stCondLst>
-                            <p:childTnLst>
-                              <p:par>
-                                <p:cTn id="14" presetID="2" presetClass="mediacall" presetSubtype="0" fill="hold" nodeType="clickEffect">
-                                  <p:stCondLst>
-                                    <p:cond delay="0"/>
-                                  </p:stCondLst>
-                                  <p:childTnLst>
-                                    <p:cmd type="call" cmd="togglePause">
-                                      <p:cBhvr additive="base">
-                                        <p:cTn id="15" dur="1" fill="hold"/>
-                                        <p:tgtEl>
-                                          <p:spTgt spid="5"/>
-                                        </p:tgtEl>
-                                      </p:cBhvr>
-                                    </p:cmd>
-                                  </p:childTnLst>
-                                </p:cTn>
-                              </p:par>
-                            </p:childTnLst>
-                          </p:cTn>
-                        </p:par>
-                      </p:childTnLst>
-                    </p:cTn>
-                  </p:par>
-                </p:childTnLst>
-              </p:cTn>
-              <p:nextCondLst>
-                <p:cond evt="onClick" delay="0">
-                  <p:tgtEl>
-                    <p:spTgt spid="5"/>
-                  </p:tgtEl>
-                </p:cond>
-              </p:nextCondLst>
-            </p:seq>
-            <p:seq concurrent="1" nextAc="seek">
-              <p:cTn id="16" restart="whenNotActive" fill="hold" evtFilter="cancelBubble" nodeType="interactiveSeq">
-                <p:stCondLst>
-                  <p:cond evt="onClick" delay="0">
-                    <p:tgtEl>
-                      <p:spTgt spid="6"/>
-                    </p:tgtEl>
-                  </p:cond>
-                </p:stCondLst>
-                <p:endSync evt="end" delay="0">
-                  <p:rtn val="all"/>
-                </p:endSync>
-                <p:childTnLst>
-                  <p:par>
-                    <p:cTn id="17" fill="hold">
-                      <p:stCondLst>
-                        <p:cond delay="0"/>
-                      </p:stCondLst>
-                      <p:childTnLst>
-                        <p:par>
-                          <p:cTn id="18" fill="hold">
-                            <p:stCondLst>
-                              <p:cond delay="0"/>
-                            </p:stCondLst>
-                            <p:childTnLst>
-                              <p:par>
-                                <p:cTn id="19" presetID="2" presetClass="mediacall" presetSubtype="0" fill="hold" nodeType="clickEffect">
-                                  <p:stCondLst>
-                                    <p:cond delay="0"/>
-                                  </p:stCondLst>
-                                  <p:childTnLst>
-                                    <p:cmd type="call" cmd="togglePause">
-                                      <p:cBhvr additive="base">
-                                        <p:cTn id="20" dur="1" fill="hold"/>
-                                        <p:tgtEl>
-                                          <p:spTgt spid="6"/>
-                                        </p:tgtEl>
-                                      </p:cBhvr>
-                                    </p:cmd>
-                                  </p:childTnLst>
-                                </p:cTn>
-                              </p:par>
-                            </p:childTnLst>
-                          </p:cTn>
-                        </p:par>
-                      </p:childTnLst>
-                    </p:cTn>
-                  </p:par>
-                </p:childTnLst>
-              </p:cTn>
-              <p:nextCondLst>
-                <p:cond evt="onClick" delay="0">
-                  <p:tgtEl>
-                    <p:spTgt spid="6"/>
-                  </p:tgtEl>
-                </p:cond>
-              </p:nextCondLst>
-            </p:seq>
-          </p:childTnLst>
-        </p:cTn>
+        <p:cTn id="1" dur="indefinite" restart="never" nodeType="tmRoot"/>
       </p:par>
     </p:tnLst>
   </p:timing>
@@ -13608,27 +13229,6 @@
     <a:masterClrMapping/>
   </p:clrMapOvr>
 </p:sld>
-</file>
-
-<file path=ppt/tags/tag1.xml><?xml version="1.0" encoding="utf-8"?>
-<p:tagLst xmlns:p="http://schemas.openxmlformats.org/presentationml/2006/main">
-  <p:tag name="KSO_WM_MEDIACOVER_FLAG" val="1"/>
-  <p:tag name="KSO_WM_UNIT_MEDIACOVER_BTN_STATE" val="1"/>
-</p:tagLst>
-</file>
-
-<file path=ppt/tags/tag2.xml><?xml version="1.0" encoding="utf-8"?>
-<p:tagLst xmlns:p="http://schemas.openxmlformats.org/presentationml/2006/main">
-  <p:tag name="KSO_WM_MEDIACOVER_FLAG" val="1"/>
-  <p:tag name="KSO_WM_UNIT_MEDIACOVER_BTN_STATE" val="1"/>
-</p:tagLst>
-</file>
-
-<file path=ppt/tags/tag3.xml><?xml version="1.0" encoding="utf-8"?>
-<p:tagLst xmlns:p="http://schemas.openxmlformats.org/presentationml/2006/main">
-  <p:tag name="KSO_WM_MEDIACOVER_FLAG" val="1"/>
-  <p:tag name="KSO_WM_UNIT_MEDIACOVER_BTN_STATE" val="1"/>
-</p:tagLst>
 </file>
 
 <file path=ppt/theme/theme1.xml><?xml version="1.0" encoding="utf-8"?>

</xml_diff>